<commit_message>
Finalizing changes (qismat not working)
- qismat not fixed
- speed adjusted
- player 3 option fixed
- board graphic fixed
- snakes and ladders added
</commit_message>
<xml_diff>
--- a/images/backgrounds/Board_design.pptx
+++ b/images/backgrounds/Board_design.pptx
@@ -105,6 +105,11 @@
       </a:defRPr>
     </a:lvl9pPr>
   </p:defaultTextStyle>
+  <p:extLst>
+    <p:ext uri="{EFAFB233-063F-42B5-8137-9DF3F51BA10A}">
+      <p15:sldGuideLst xmlns:p15="http://schemas.microsoft.com/office/powerpoint/2012/main"/>
+    </p:ext>
+  </p:extLst>
 </p:presentation>
 </file>
 
@@ -255,7 +260,7 @@
           <a:p>
             <a:fld id="{19B9D62D-1F53-444E-8A25-346A2F375003}" type="datetimeFigureOut">
               <a:rPr lang="en-US" smtClean="0"/>
-              <a:t>21-May-21</a:t>
+              <a:t>24-May-21</a:t>
             </a:fld>
             <a:endParaRPr lang="en-US"/>
           </a:p>
@@ -453,7 +458,7 @@
           <a:p>
             <a:fld id="{19B9D62D-1F53-444E-8A25-346A2F375003}" type="datetimeFigureOut">
               <a:rPr lang="en-US" smtClean="0"/>
-              <a:t>21-May-21</a:t>
+              <a:t>24-May-21</a:t>
             </a:fld>
             <a:endParaRPr lang="en-US"/>
           </a:p>
@@ -661,7 +666,7 @@
           <a:p>
             <a:fld id="{19B9D62D-1F53-444E-8A25-346A2F375003}" type="datetimeFigureOut">
               <a:rPr lang="en-US" smtClean="0"/>
-              <a:t>21-May-21</a:t>
+              <a:t>24-May-21</a:t>
             </a:fld>
             <a:endParaRPr lang="en-US"/>
           </a:p>
@@ -859,7 +864,7 @@
           <a:p>
             <a:fld id="{19B9D62D-1F53-444E-8A25-346A2F375003}" type="datetimeFigureOut">
               <a:rPr lang="en-US" smtClean="0"/>
-              <a:t>21-May-21</a:t>
+              <a:t>24-May-21</a:t>
             </a:fld>
             <a:endParaRPr lang="en-US"/>
           </a:p>
@@ -1134,7 +1139,7 @@
           <a:p>
             <a:fld id="{19B9D62D-1F53-444E-8A25-346A2F375003}" type="datetimeFigureOut">
               <a:rPr lang="en-US" smtClean="0"/>
-              <a:t>21-May-21</a:t>
+              <a:t>24-May-21</a:t>
             </a:fld>
             <a:endParaRPr lang="en-US"/>
           </a:p>
@@ -1399,7 +1404,7 @@
           <a:p>
             <a:fld id="{19B9D62D-1F53-444E-8A25-346A2F375003}" type="datetimeFigureOut">
               <a:rPr lang="en-US" smtClean="0"/>
-              <a:t>21-May-21</a:t>
+              <a:t>24-May-21</a:t>
             </a:fld>
             <a:endParaRPr lang="en-US"/>
           </a:p>
@@ -1811,7 +1816,7 @@
           <a:p>
             <a:fld id="{19B9D62D-1F53-444E-8A25-346A2F375003}" type="datetimeFigureOut">
               <a:rPr lang="en-US" smtClean="0"/>
-              <a:t>21-May-21</a:t>
+              <a:t>24-May-21</a:t>
             </a:fld>
             <a:endParaRPr lang="en-US"/>
           </a:p>
@@ -1952,7 +1957,7 @@
           <a:p>
             <a:fld id="{19B9D62D-1F53-444E-8A25-346A2F375003}" type="datetimeFigureOut">
               <a:rPr lang="en-US" smtClean="0"/>
-              <a:t>21-May-21</a:t>
+              <a:t>24-May-21</a:t>
             </a:fld>
             <a:endParaRPr lang="en-US"/>
           </a:p>
@@ -2065,7 +2070,7 @@
           <a:p>
             <a:fld id="{19B9D62D-1F53-444E-8A25-346A2F375003}" type="datetimeFigureOut">
               <a:rPr lang="en-US" smtClean="0"/>
-              <a:t>21-May-21</a:t>
+              <a:t>24-May-21</a:t>
             </a:fld>
             <a:endParaRPr lang="en-US"/>
           </a:p>
@@ -2376,7 +2381,7 @@
           <a:p>
             <a:fld id="{19B9D62D-1F53-444E-8A25-346A2F375003}" type="datetimeFigureOut">
               <a:rPr lang="en-US" smtClean="0"/>
-              <a:t>21-May-21</a:t>
+              <a:t>24-May-21</a:t>
             </a:fld>
             <a:endParaRPr lang="en-US"/>
           </a:p>
@@ -2664,7 +2669,7 @@
           <a:p>
             <a:fld id="{19B9D62D-1F53-444E-8A25-346A2F375003}" type="datetimeFigureOut">
               <a:rPr lang="en-US" smtClean="0"/>
-              <a:t>21-May-21</a:t>
+              <a:t>24-May-21</a:t>
             </a:fld>
             <a:endParaRPr lang="en-US"/>
           </a:p>
@@ -2905,7 +2910,7 @@
           <a:p>
             <a:fld id="{19B9D62D-1F53-444E-8A25-346A2F375003}" type="datetimeFigureOut">
               <a:rPr lang="en-US" smtClean="0"/>
-              <a:t>21-May-21</a:t>
+              <a:t>24-May-21</a:t>
             </a:fld>
             <a:endParaRPr lang="en-US"/>
           </a:p>
@@ -3538,10 +3543,10 @@
       </p:grpSpPr>
       <p:pic>
         <p:nvPicPr>
-          <p:cNvPr id="7" name="Picture 6">
-            <a:extLst>
-              <a:ext uri="{FF2B5EF4-FFF2-40B4-BE49-F238E27FC236}">
-                <a16:creationId xmlns:a16="http://schemas.microsoft.com/office/drawing/2014/main" id="{CB982F3B-ECE1-4274-8B92-4F96CA147159}"/>
+          <p:cNvPr id="3" name="Picture 2">
+            <a:extLst>
+              <a:ext uri="{FF2B5EF4-FFF2-40B4-BE49-F238E27FC236}">
+                <a16:creationId xmlns:a16="http://schemas.microsoft.com/office/drawing/2014/main" id="{5F2AF6BF-5C10-48DF-AC6B-FD5DA5BC8856}"/>
               </a:ext>
             </a:extLst>
           </p:cNvPr>
@@ -3636,8 +3641,8 @@
         </p:nvGrpSpPr>
         <p:grpSpPr>
           <a:xfrm>
-            <a:off x="6408409" y="257830"/>
-            <a:ext cx="672661" cy="608878"/>
+            <a:off x="6479554" y="322229"/>
+            <a:ext cx="530372" cy="480080"/>
             <a:chOff x="6328207" y="2846048"/>
             <a:chExt cx="672661" cy="608878"/>
           </a:xfrm>
@@ -3934,8 +3939,8 @@
         </p:nvGrpSpPr>
         <p:grpSpPr>
           <a:xfrm>
-            <a:off x="9766313" y="4913346"/>
-            <a:ext cx="672661" cy="608878"/>
+            <a:off x="9837458" y="4977745"/>
+            <a:ext cx="530372" cy="480080"/>
             <a:chOff x="6328207" y="2846048"/>
             <a:chExt cx="672661" cy="608878"/>
           </a:xfrm>
@@ -4120,8 +4125,8 @@
         </p:nvGrpSpPr>
         <p:grpSpPr>
           <a:xfrm>
-            <a:off x="5063431" y="3641578"/>
-            <a:ext cx="672661" cy="608878"/>
+            <a:off x="5134576" y="3705977"/>
+            <a:ext cx="530372" cy="480080"/>
             <a:chOff x="6328207" y="2846048"/>
             <a:chExt cx="672661" cy="608878"/>
           </a:xfrm>
@@ -4401,8 +4406,8 @@
         </p:nvGrpSpPr>
         <p:grpSpPr>
           <a:xfrm>
-            <a:off x="5751919" y="2900147"/>
-            <a:ext cx="672661" cy="608878"/>
+            <a:off x="5823064" y="2964546"/>
+            <a:ext cx="530372" cy="480080"/>
             <a:chOff x="6328207" y="2846048"/>
             <a:chExt cx="672661" cy="608878"/>
           </a:xfrm>
@@ -4643,8 +4648,8 @@
         </p:nvGrpSpPr>
         <p:grpSpPr>
           <a:xfrm>
-            <a:off x="8416268" y="1566256"/>
-            <a:ext cx="672661" cy="608878"/>
+            <a:off x="8487413" y="1630655"/>
+            <a:ext cx="530372" cy="480080"/>
             <a:chOff x="6328207" y="2846048"/>
             <a:chExt cx="672661" cy="608878"/>
           </a:xfrm>
@@ -4893,13 +4898,13 @@
               </a:ext>
             </a:extLst>
           </a:blip>
-          <a:srcRect l="1" t="8416" r="-1" b="10692"/>
+          <a:srcRect l="2" t="24090" r="-2" b="10692"/>
           <a:stretch/>
         </p:blipFill>
         <p:spPr>
-          <a:xfrm rot="2662557" flipH="1">
-            <a:off x="6570780" y="4790534"/>
-            <a:ext cx="485271" cy="2053815"/>
+          <a:xfrm rot="3622137" flipH="1">
+            <a:off x="6515188" y="5326563"/>
+            <a:ext cx="485271" cy="1655850"/>
           </a:xfrm>
           <a:prstGeom prst="rect">
             <a:avLst/>
@@ -4939,8 +4944,8 @@
           <a:stretch/>
         </p:blipFill>
         <p:spPr>
-          <a:xfrm rot="1638316" flipH="1">
-            <a:off x="4838992" y="276471"/>
+          <a:xfrm rot="19961684">
+            <a:off x="10212309" y="4367033"/>
             <a:ext cx="485271" cy="1663251"/>
           </a:xfrm>
           <a:prstGeom prst="rect">
@@ -5102,6 +5107,62 @@
           </p:spPr>
         </p:pic>
       </p:grpSp>
+      <p:sp>
+        <p:nvSpPr>
+          <p:cNvPr id="57" name="Trapezoid 56">
+            <a:extLst>
+              <a:ext uri="{FF2B5EF4-FFF2-40B4-BE49-F238E27FC236}">
+                <a16:creationId xmlns:a16="http://schemas.microsoft.com/office/drawing/2014/main" id="{9F449752-A7F4-46E0-B1D9-83FA90EED5A5}"/>
+              </a:ext>
+            </a:extLst>
+          </p:cNvPr>
+          <p:cNvSpPr/>
+          <p:nvPr/>
+        </p:nvSpPr>
+        <p:spPr>
+          <a:xfrm rot="11881755">
+            <a:off x="4838909" y="516330"/>
+            <a:ext cx="341870" cy="2082625"/>
+          </a:xfrm>
+          <a:prstGeom prst="trapezoid">
+            <a:avLst>
+              <a:gd name="adj" fmla="val 18035"/>
+            </a:avLst>
+          </a:prstGeom>
+          <a:solidFill>
+            <a:schemeClr val="accent4">
+              <a:alpha val="50000"/>
+            </a:schemeClr>
+          </a:solidFill>
+          <a:ln>
+            <a:noFill/>
+          </a:ln>
+        </p:spPr>
+        <p:style>
+          <a:lnRef idx="2">
+            <a:schemeClr val="accent1">
+              <a:shade val="50000"/>
+            </a:schemeClr>
+          </a:lnRef>
+          <a:fillRef idx="1">
+            <a:schemeClr val="accent1"/>
+          </a:fillRef>
+          <a:effectRef idx="0">
+            <a:schemeClr val="accent1"/>
+          </a:effectRef>
+          <a:fontRef idx="minor">
+            <a:schemeClr val="lt1"/>
+          </a:fontRef>
+        </p:style>
+        <p:txBody>
+          <a:bodyPr rtlCol="0" anchor="ctr"/>
+          <a:lstStyle/>
+          <a:p>
+            <a:pPr algn="ctr"/>
+            <a:endParaRPr lang="en-US" dirty="0"/>
+          </a:p>
+        </p:txBody>
+      </p:sp>
       <p:pic>
         <p:nvPicPr>
           <p:cNvPr id="39" name="Picture 38">
@@ -5158,8 +5219,8 @@
         </p:nvGrpSpPr>
         <p:grpSpPr>
           <a:xfrm>
-            <a:off x="7733452" y="262665"/>
-            <a:ext cx="672661" cy="608878"/>
+            <a:off x="7804597" y="327064"/>
+            <a:ext cx="530372" cy="480080"/>
             <a:chOff x="6328207" y="2846048"/>
             <a:chExt cx="672661" cy="608878"/>
           </a:xfrm>
@@ -5291,6 +5352,234 @@
           </p:spPr>
         </p:pic>
       </p:grpSp>
+      <p:grpSp>
+        <p:nvGrpSpPr>
+          <p:cNvPr id="49" name="Group 48">
+            <a:extLst>
+              <a:ext uri="{FF2B5EF4-FFF2-40B4-BE49-F238E27FC236}">
+                <a16:creationId xmlns:a16="http://schemas.microsoft.com/office/drawing/2014/main" id="{BBF79ABD-3A9F-4543-9F8E-90DDB75CDB5C}"/>
+              </a:ext>
+            </a:extLst>
+          </p:cNvPr>
+          <p:cNvGrpSpPr/>
+          <p:nvPr/>
+        </p:nvGrpSpPr>
+        <p:grpSpPr>
+          <a:xfrm>
+            <a:off x="5098225" y="325254"/>
+            <a:ext cx="530372" cy="480080"/>
+            <a:chOff x="6328207" y="2846048"/>
+            <a:chExt cx="672661" cy="608878"/>
+          </a:xfrm>
+        </p:grpSpPr>
+        <p:pic>
+          <p:nvPicPr>
+            <p:cNvPr id="53" name="Picture 52">
+              <a:extLst>
+                <a:ext uri="{FF2B5EF4-FFF2-40B4-BE49-F238E27FC236}">
+                  <a16:creationId xmlns:a16="http://schemas.microsoft.com/office/drawing/2014/main" id="{A84924FB-493C-4046-80AD-CE2C0FE5F3D5}"/>
+                </a:ext>
+              </a:extLst>
+            </p:cNvPr>
+            <p:cNvPicPr>
+              <a:picLocks noChangeAspect="1"/>
+            </p:cNvPicPr>
+            <p:nvPr/>
+          </p:nvPicPr>
+          <p:blipFill rotWithShape="1">
+            <a:blip r:embed="rId3" cstate="print">
+              <a:extLst>
+                <a:ext uri="{28A0092B-C50C-407E-A947-70E740481C1C}">
+                  <a14:useLocalDpi xmlns:a14="http://schemas.microsoft.com/office/drawing/2010/main" val="0"/>
+                </a:ext>
+              </a:extLst>
+            </a:blip>
+            <a:srcRect l="25659" r="25659"/>
+            <a:stretch/>
+          </p:blipFill>
+          <p:spPr>
+            <a:xfrm>
+              <a:off x="6354074" y="2846048"/>
+              <a:ext cx="354584" cy="364182"/>
+            </a:xfrm>
+            <a:prstGeom prst="rect">
+              <a:avLst/>
+            </a:prstGeom>
+            <a:effectLst>
+              <a:outerShdw blurRad="63500" sx="102000" sy="102000" algn="ctr" rotWithShape="0">
+                <a:prstClr val="black">
+                  <a:alpha val="40000"/>
+                </a:prstClr>
+              </a:outerShdw>
+            </a:effectLst>
+          </p:spPr>
+        </p:pic>
+        <p:pic>
+          <p:nvPicPr>
+            <p:cNvPr id="54" name="Picture 53">
+              <a:extLst>
+                <a:ext uri="{FF2B5EF4-FFF2-40B4-BE49-F238E27FC236}">
+                  <a16:creationId xmlns:a16="http://schemas.microsoft.com/office/drawing/2014/main" id="{4715EF6B-F843-47CB-9DFC-A62687E48D1F}"/>
+                </a:ext>
+              </a:extLst>
+            </p:cNvPr>
+            <p:cNvPicPr>
+              <a:picLocks noChangeAspect="1"/>
+            </p:cNvPicPr>
+            <p:nvPr/>
+          </p:nvPicPr>
+          <p:blipFill rotWithShape="1">
+            <a:blip r:embed="rId4" cstate="print">
+              <a:extLst>
+                <a:ext uri="{28A0092B-C50C-407E-A947-70E740481C1C}">
+                  <a14:useLocalDpi xmlns:a14="http://schemas.microsoft.com/office/drawing/2010/main" val="0"/>
+                </a:ext>
+              </a:extLst>
+            </a:blip>
+            <a:srcRect l="25659" r="25659"/>
+            <a:stretch/>
+          </p:blipFill>
+          <p:spPr>
+            <a:xfrm>
+              <a:off x="6491596" y="2911336"/>
+              <a:ext cx="509272" cy="523058"/>
+            </a:xfrm>
+            <a:prstGeom prst="rect">
+              <a:avLst/>
+            </a:prstGeom>
+            <a:effectLst>
+              <a:outerShdw blurRad="50800" dist="38100" dir="2700000" algn="tl" rotWithShape="0">
+                <a:prstClr val="black">
+                  <a:alpha val="40000"/>
+                </a:prstClr>
+              </a:outerShdw>
+            </a:effectLst>
+          </p:spPr>
+        </p:pic>
+        <p:pic>
+          <p:nvPicPr>
+            <p:cNvPr id="55" name="Picture 54">
+              <a:extLst>
+                <a:ext uri="{FF2B5EF4-FFF2-40B4-BE49-F238E27FC236}">
+                  <a16:creationId xmlns:a16="http://schemas.microsoft.com/office/drawing/2014/main" id="{9A225F3B-A7D1-4A48-9CDA-903F1B1BD487}"/>
+                </a:ext>
+              </a:extLst>
+            </p:cNvPr>
+            <p:cNvPicPr>
+              <a:picLocks noChangeAspect="1"/>
+            </p:cNvPicPr>
+            <p:nvPr/>
+          </p:nvPicPr>
+          <p:blipFill rotWithShape="1">
+            <a:blip r:embed="rId5" cstate="print">
+              <a:extLst>
+                <a:ext uri="{28A0092B-C50C-407E-A947-70E740481C1C}">
+                  <a14:useLocalDpi xmlns:a14="http://schemas.microsoft.com/office/drawing/2010/main" val="0"/>
+                </a:ext>
+              </a:extLst>
+            </a:blip>
+            <a:srcRect l="25659" r="25659"/>
+            <a:stretch/>
+          </p:blipFill>
+          <p:spPr>
+            <a:xfrm rot="4284721">
+              <a:off x="6332913" y="3102521"/>
+              <a:ext cx="347699" cy="357112"/>
+            </a:xfrm>
+            <a:prstGeom prst="rect">
+              <a:avLst/>
+            </a:prstGeom>
+            <a:effectLst>
+              <a:outerShdw blurRad="50800" dist="38100" dir="2700000" algn="tl" rotWithShape="0">
+                <a:prstClr val="black">
+                  <a:alpha val="40000"/>
+                </a:prstClr>
+              </a:outerShdw>
+            </a:effectLst>
+          </p:spPr>
+        </p:pic>
+      </p:grpSp>
+      <p:pic>
+        <p:nvPicPr>
+          <p:cNvPr id="56" name="Graphic 55" descr="Gender">
+            <a:extLst>
+              <a:ext uri="{FF2B5EF4-FFF2-40B4-BE49-F238E27FC236}">
+                <a16:creationId xmlns:a16="http://schemas.microsoft.com/office/drawing/2014/main" id="{B23E9BD4-8505-4A5E-96D2-BCC443C30DD5}"/>
+              </a:ext>
+            </a:extLst>
+          </p:cNvPr>
+          <p:cNvPicPr>
+            <a:picLocks noChangeAspect="1"/>
+          </p:cNvPicPr>
+          <p:nvPr/>
+        </p:nvPicPr>
+        <p:blipFill>
+          <a:blip r:embed="rId6" cstate="print">
+            <a:extLst>
+              <a:ext uri="{28A0092B-C50C-407E-A947-70E740481C1C}">
+                <a14:useLocalDpi xmlns:a14="http://schemas.microsoft.com/office/drawing/2010/main" val="0"/>
+              </a:ext>
+              <a:ext uri="{96DAC541-7B7A-43D3-8B79-37D633B846F1}">
+                <asvg:svgBlip xmlns:asvg="http://schemas.microsoft.com/office/drawing/2016/SVG/main" r:embed="rId7"/>
+              </a:ext>
+            </a:extLst>
+          </a:blip>
+          <a:stretch>
+            <a:fillRect/>
+          </a:stretch>
+        </p:blipFill>
+        <p:spPr>
+          <a:xfrm>
+            <a:off x="4507342" y="2380199"/>
+            <a:ext cx="341870" cy="341870"/>
+          </a:xfrm>
+          <a:prstGeom prst="rect">
+            <a:avLst/>
+          </a:prstGeom>
+        </p:spPr>
+      </p:pic>
+      <p:pic>
+        <p:nvPicPr>
+          <p:cNvPr id="64" name="Picture 63">
+            <a:extLst>
+              <a:ext uri="{FF2B5EF4-FFF2-40B4-BE49-F238E27FC236}">
+                <a16:creationId xmlns:a16="http://schemas.microsoft.com/office/drawing/2014/main" id="{0B13FBAB-7FA3-4CA0-944A-11624E2833BF}"/>
+              </a:ext>
+            </a:extLst>
+          </p:cNvPr>
+          <p:cNvPicPr>
+            <a:picLocks noChangeAspect="1"/>
+          </p:cNvPicPr>
+          <p:nvPr/>
+        </p:nvPicPr>
+        <p:blipFill rotWithShape="1">
+          <a:blip r:embed="rId8">
+            <a:extLst>
+              <a:ext uri="{28A0092B-C50C-407E-A947-70E740481C1C}">
+                <a14:useLocalDpi xmlns:a14="http://schemas.microsoft.com/office/drawing/2010/main" val="0"/>
+              </a:ext>
+            </a:extLst>
+          </a:blip>
+          <a:srcRect l="1" t="23799" r="-1" b="10692"/>
+          <a:stretch/>
+        </p:blipFill>
+        <p:spPr>
+          <a:xfrm rot="1672658">
+            <a:off x="6193374" y="3677491"/>
+            <a:ext cx="485271" cy="1663251"/>
+          </a:xfrm>
+          <a:prstGeom prst="rect">
+            <a:avLst/>
+          </a:prstGeom>
+          <a:effectLst>
+            <a:outerShdw blurRad="50800" dist="12700" dir="2700000" algn="tl" rotWithShape="0">
+              <a:prstClr val="black">
+                <a:alpha val="40000"/>
+              </a:prstClr>
+            </a:outerShdw>
+          </a:effectLst>
+        </p:spPr>
+      </p:pic>
     </p:spTree>
     <p:extLst>
       <p:ext uri="{BB962C8B-B14F-4D97-AF65-F5344CB8AC3E}">

</xml_diff>